<commit_message>
Add batch readme file
</commit_message>
<xml_diff>
--- a/0.docs/diagrams-templates.pptx
+++ b/0.docs/diagrams-templates.pptx
@@ -262,7 +262,7 @@
           <a:p>
             <a:fld id="{EBAE0DFD-7312-9144-8250-D29833609FD2}" type="datetimeFigureOut">
               <a:rPr lang="en-US" smtClean="0"/>
-              <a:t>7/3/23</a:t>
+              <a:t>7/7/23</a:t>
             </a:fld>
             <a:endParaRPr lang="en-US"/>
           </a:p>
@@ -460,7 +460,7 @@
           <a:p>
             <a:fld id="{EBAE0DFD-7312-9144-8250-D29833609FD2}" type="datetimeFigureOut">
               <a:rPr lang="en-US" smtClean="0"/>
-              <a:t>7/3/23</a:t>
+              <a:t>7/7/23</a:t>
             </a:fld>
             <a:endParaRPr lang="en-US"/>
           </a:p>
@@ -668,7 +668,7 @@
           <a:p>
             <a:fld id="{EBAE0DFD-7312-9144-8250-D29833609FD2}" type="datetimeFigureOut">
               <a:rPr lang="en-US" smtClean="0"/>
-              <a:t>7/3/23</a:t>
+              <a:t>7/7/23</a:t>
             </a:fld>
             <a:endParaRPr lang="en-US"/>
           </a:p>
@@ -866,7 +866,7 @@
           <a:p>
             <a:fld id="{EBAE0DFD-7312-9144-8250-D29833609FD2}" type="datetimeFigureOut">
               <a:rPr lang="en-US" smtClean="0"/>
-              <a:t>7/3/23</a:t>
+              <a:t>7/7/23</a:t>
             </a:fld>
             <a:endParaRPr lang="en-US"/>
           </a:p>
@@ -1141,7 +1141,7 @@
           <a:p>
             <a:fld id="{EBAE0DFD-7312-9144-8250-D29833609FD2}" type="datetimeFigureOut">
               <a:rPr lang="en-US" smtClean="0"/>
-              <a:t>7/3/23</a:t>
+              <a:t>7/7/23</a:t>
             </a:fld>
             <a:endParaRPr lang="en-US"/>
           </a:p>
@@ -1406,7 +1406,7 @@
           <a:p>
             <a:fld id="{EBAE0DFD-7312-9144-8250-D29833609FD2}" type="datetimeFigureOut">
               <a:rPr lang="en-US" smtClean="0"/>
-              <a:t>7/3/23</a:t>
+              <a:t>7/7/23</a:t>
             </a:fld>
             <a:endParaRPr lang="en-US"/>
           </a:p>
@@ -1818,7 +1818,7 @@
           <a:p>
             <a:fld id="{EBAE0DFD-7312-9144-8250-D29833609FD2}" type="datetimeFigureOut">
               <a:rPr lang="en-US" smtClean="0"/>
-              <a:t>7/3/23</a:t>
+              <a:t>7/7/23</a:t>
             </a:fld>
             <a:endParaRPr lang="en-US"/>
           </a:p>
@@ -1959,7 +1959,7 @@
           <a:p>
             <a:fld id="{EBAE0DFD-7312-9144-8250-D29833609FD2}" type="datetimeFigureOut">
               <a:rPr lang="en-US" smtClean="0"/>
-              <a:t>7/3/23</a:t>
+              <a:t>7/7/23</a:t>
             </a:fld>
             <a:endParaRPr lang="en-US"/>
           </a:p>
@@ -2072,7 +2072,7 @@
           <a:p>
             <a:fld id="{EBAE0DFD-7312-9144-8250-D29833609FD2}" type="datetimeFigureOut">
               <a:rPr lang="en-US" smtClean="0"/>
-              <a:t>7/3/23</a:t>
+              <a:t>7/7/23</a:t>
             </a:fld>
             <a:endParaRPr lang="en-US"/>
           </a:p>
@@ -2383,7 +2383,7 @@
           <a:p>
             <a:fld id="{EBAE0DFD-7312-9144-8250-D29833609FD2}" type="datetimeFigureOut">
               <a:rPr lang="en-US" smtClean="0"/>
-              <a:t>7/3/23</a:t>
+              <a:t>7/7/23</a:t>
             </a:fld>
             <a:endParaRPr lang="en-US"/>
           </a:p>
@@ -2671,7 +2671,7 @@
           <a:p>
             <a:fld id="{EBAE0DFD-7312-9144-8250-D29833609FD2}" type="datetimeFigureOut">
               <a:rPr lang="en-US" smtClean="0"/>
-              <a:t>7/3/23</a:t>
+              <a:t>7/7/23</a:t>
             </a:fld>
             <a:endParaRPr lang="en-US"/>
           </a:p>
@@ -2912,7 +2912,7 @@
           <a:p>
             <a:fld id="{EBAE0DFD-7312-9144-8250-D29833609FD2}" type="datetimeFigureOut">
               <a:rPr lang="en-US" smtClean="0"/>
-              <a:t>7/3/23</a:t>
+              <a:t>7/7/23</a:t>
             </a:fld>
             <a:endParaRPr lang="en-US"/>
           </a:p>
@@ -7966,6 +7966,42 @@
           </a:p>
         </p:txBody>
       </p:sp>
+      <p:sp>
+        <p:nvSpPr>
+          <p:cNvPr id="2" name="TextBox 1">
+            <a:extLst>
+              <a:ext uri="{FF2B5EF4-FFF2-40B4-BE49-F238E27FC236}">
+                <a16:creationId xmlns:a16="http://schemas.microsoft.com/office/drawing/2014/main" id="{87CFD8F0-6E64-2AC4-48D3-21BC407A7C96}"/>
+              </a:ext>
+            </a:extLst>
+          </p:cNvPr>
+          <p:cNvSpPr txBox="1"/>
+          <p:nvPr/>
+        </p:nvSpPr>
+        <p:spPr>
+          <a:xfrm>
+            <a:off x="758441" y="463443"/>
+            <a:ext cx="2862579" cy="646331"/>
+          </a:xfrm>
+          <a:prstGeom prst="rect">
+            <a:avLst/>
+          </a:prstGeom>
+          <a:noFill/>
+        </p:spPr>
+        <p:txBody>
+          <a:bodyPr wrap="none" rtlCol="0">
+            <a:spAutoFit/>
+          </a:bodyPr>
+          <a:lstStyle/>
+          <a:p>
+            <a:r>
+              <a:rPr lang="en-US" sz="3600" dirty="0" err="1"/>
+              <a:t>ParallelCluster</a:t>
+            </a:r>
+            <a:endParaRPr lang="en-US" sz="3600" dirty="0"/>
+          </a:p>
+        </p:txBody>
+      </p:sp>
     </p:spTree>
     <p:extLst>
       <p:ext uri="{BB962C8B-B14F-4D97-AF65-F5344CB8AC3E}">
@@ -10076,6 +10112,41 @@
           </p:spPr>
         </p:pic>
       </p:grpSp>
+      <p:sp>
+        <p:nvSpPr>
+          <p:cNvPr id="6" name="TextBox 5">
+            <a:extLst>
+              <a:ext uri="{FF2B5EF4-FFF2-40B4-BE49-F238E27FC236}">
+                <a16:creationId xmlns:a16="http://schemas.microsoft.com/office/drawing/2014/main" id="{F99E0CD7-5FAF-50FF-F5A0-2F9D8F0C0928}"/>
+              </a:ext>
+            </a:extLst>
+          </p:cNvPr>
+          <p:cNvSpPr txBox="1"/>
+          <p:nvPr/>
+        </p:nvSpPr>
+        <p:spPr>
+          <a:xfrm>
+            <a:off x="9046334" y="1509828"/>
+            <a:ext cx="2238113" cy="646331"/>
+          </a:xfrm>
+          <a:prstGeom prst="rect">
+            <a:avLst/>
+          </a:prstGeom>
+          <a:noFill/>
+        </p:spPr>
+        <p:txBody>
+          <a:bodyPr wrap="none" rtlCol="0">
+            <a:spAutoFit/>
+          </a:bodyPr>
+          <a:lstStyle/>
+          <a:p>
+            <a:r>
+              <a:rPr lang="en-US" sz="3600" dirty="0"/>
+              <a:t>VPC all AZs</a:t>
+            </a:r>
+          </a:p>
+        </p:txBody>
+      </p:sp>
     </p:spTree>
     <p:extLst>
       <p:ext uri="{BB962C8B-B14F-4D97-AF65-F5344CB8AC3E}">
@@ -11429,6 +11500,41 @@
           </p:spPr>
         </p:pic>
       </p:grpSp>
+      <p:sp>
+        <p:nvSpPr>
+          <p:cNvPr id="3" name="TextBox 2">
+            <a:extLst>
+              <a:ext uri="{FF2B5EF4-FFF2-40B4-BE49-F238E27FC236}">
+                <a16:creationId xmlns:a16="http://schemas.microsoft.com/office/drawing/2014/main" id="{EB1E4A99-F948-6BFB-B2D1-3676A23868A9}"/>
+              </a:ext>
+            </a:extLst>
+          </p:cNvPr>
+          <p:cNvSpPr txBox="1"/>
+          <p:nvPr/>
+        </p:nvSpPr>
+        <p:spPr>
+          <a:xfrm>
+            <a:off x="758441" y="463443"/>
+            <a:ext cx="2401619" cy="646331"/>
+          </a:xfrm>
+          <a:prstGeom prst="rect">
+            <a:avLst/>
+          </a:prstGeom>
+          <a:noFill/>
+        </p:spPr>
+        <p:txBody>
+          <a:bodyPr wrap="none" rtlCol="0">
+            <a:spAutoFit/>
+          </a:bodyPr>
+          <a:lstStyle/>
+          <a:p>
+            <a:r>
+              <a:rPr lang="en-US" sz="3600" dirty="0"/>
+              <a:t>VPC One AZ</a:t>
+            </a:r>
+          </a:p>
+        </p:txBody>
+      </p:sp>
     </p:spTree>
     <p:extLst>
       <p:ext uri="{BB962C8B-B14F-4D97-AF65-F5344CB8AC3E}">
@@ -15047,6 +15153,41 @@
           </a:fontRef>
         </p:style>
       </p:cxnSp>
+      <p:sp>
+        <p:nvSpPr>
+          <p:cNvPr id="2" name="TextBox 1">
+            <a:extLst>
+              <a:ext uri="{FF2B5EF4-FFF2-40B4-BE49-F238E27FC236}">
+                <a16:creationId xmlns:a16="http://schemas.microsoft.com/office/drawing/2014/main" id="{1D554AC4-003D-2AF4-2B1E-4BAFA2652217}"/>
+              </a:ext>
+            </a:extLst>
+          </p:cNvPr>
+          <p:cNvSpPr txBox="1"/>
+          <p:nvPr/>
+        </p:nvSpPr>
+        <p:spPr>
+          <a:xfrm>
+            <a:off x="758441" y="463443"/>
+            <a:ext cx="1239122" cy="646331"/>
+          </a:xfrm>
+          <a:prstGeom prst="rect">
+            <a:avLst/>
+          </a:prstGeom>
+          <a:noFill/>
+        </p:spPr>
+        <p:txBody>
+          <a:bodyPr wrap="none" rtlCol="0">
+            <a:spAutoFit/>
+          </a:bodyPr>
+          <a:lstStyle/>
+          <a:p>
+            <a:r>
+              <a:rPr lang="en-US" sz="3600" dirty="0"/>
+              <a:t>Batch</a:t>
+            </a:r>
+          </a:p>
+        </p:txBody>
+      </p:sp>
     </p:spTree>
     <p:extLst>
       <p:ext uri="{BB962C8B-B14F-4D97-AF65-F5344CB8AC3E}">

</xml_diff>